<commit_message>
update syllabus 17 JavaScript, 2025/10/06
</commit_message>
<xml_diff>
--- a/syllabus/18_framework_jQuery/syllabus_18_jQuery.pptx
+++ b/syllabus/18_framework_jQuery/syllabus_18_jQuery.pptx
@@ -344,7 +344,7 @@
           <a:p>
             <a:fld id="{FCE9742F-4DAE-47F5-9244-6ACC3985DD6B}" type="datetimeFigureOut">
               <a:rPr lang="fr-BE" smtClean="0"/>
-              <a:t>09-09-25</a:t>
+              <a:t>06-10-25</a:t>
             </a:fld>
             <a:endParaRPr lang="fr-BE"/>
           </a:p>
@@ -1293,7 +1293,7 @@
           <a:p>
             <a:fld id="{F3953782-D06E-4853-BE3C-64C197273937}" type="datetimeFigureOut">
               <a:rPr lang="fr-BE" smtClean="0"/>
-              <a:t>09-09-25</a:t>
+              <a:t>06-10-25</a:t>
             </a:fld>
             <a:endParaRPr lang="fr-BE"/>
           </a:p>
@@ -3161,7 +3161,7 @@
           <a:p>
             <a:fld id="{F3953782-D06E-4853-BE3C-64C197273937}" type="datetimeFigureOut">
               <a:rPr lang="fr-BE" smtClean="0"/>
-              <a:t>09-09-25</a:t>
+              <a:t>06-10-25</a:t>
             </a:fld>
             <a:endParaRPr lang="fr-BE"/>
           </a:p>
@@ -3477,7 +3477,7 @@
           <a:p>
             <a:fld id="{F3953782-D06E-4853-BE3C-64C197273937}" type="datetimeFigureOut">
               <a:rPr lang="fr-BE" smtClean="0"/>
-              <a:t>09-09-25</a:t>
+              <a:t>06-10-25</a:t>
             </a:fld>
             <a:endParaRPr lang="fr-BE"/>
           </a:p>
@@ -3674,7 +3674,7 @@
           <a:p>
             <a:fld id="{F3953782-D06E-4853-BE3C-64C197273937}" type="datetimeFigureOut">
               <a:rPr lang="fr-BE" smtClean="0"/>
-              <a:t>09-09-25</a:t>
+              <a:t>06-10-25</a:t>
             </a:fld>
             <a:endParaRPr lang="fr-BE"/>
           </a:p>
@@ -3936,7 +3936,7 @@
           <a:p>
             <a:fld id="{F3953782-D06E-4853-BE3C-64C197273937}" type="datetimeFigureOut">
               <a:rPr lang="fr-BE" smtClean="0"/>
-              <a:t>09-09-25</a:t>
+              <a:t>06-10-25</a:t>
             </a:fld>
             <a:endParaRPr lang="fr-BE"/>
           </a:p>
@@ -4334,7 +4334,7 @@
           <a:p>
             <a:fld id="{F3953782-D06E-4853-BE3C-64C197273937}" type="datetimeFigureOut">
               <a:rPr lang="fr-BE" smtClean="0"/>
-              <a:t>09-09-25</a:t>
+              <a:t>06-10-25</a:t>
             </a:fld>
             <a:endParaRPr lang="fr-BE"/>
           </a:p>
@@ -4482,7 +4482,7 @@
           <a:p>
             <a:fld id="{F3953782-D06E-4853-BE3C-64C197273937}" type="datetimeFigureOut">
               <a:rPr lang="fr-BE" smtClean="0"/>
-              <a:t>09-09-25</a:t>
+              <a:t>06-10-25</a:t>
             </a:fld>
             <a:endParaRPr lang="fr-BE"/>
           </a:p>
@@ -4831,7 +4831,7 @@
           <a:p>
             <a:fld id="{F3953782-D06E-4853-BE3C-64C197273937}" type="datetimeFigureOut">
               <a:rPr lang="fr-BE" smtClean="0"/>
-              <a:t>09-09-25</a:t>
+              <a:t>06-10-25</a:t>
             </a:fld>
             <a:endParaRPr lang="fr-BE"/>
           </a:p>
@@ -5157,7 +5157,7 @@
           <a:p>
             <a:fld id="{F3953782-D06E-4853-BE3C-64C197273937}" type="datetimeFigureOut">
               <a:rPr lang="fr-BE" smtClean="0"/>
-              <a:t>09-09-25</a:t>
+              <a:t>06-10-25</a:t>
             </a:fld>
             <a:endParaRPr lang="fr-BE"/>
           </a:p>
@@ -5808,7 +5808,7 @@
         <p14:reveal/>
       </p:transition>
     </mc:Choice>
-    <mc:Fallback xmlns:ahyp="http://schemas.microsoft.com/office/drawing/2018/hyperlinkcolor" xmlns:p15="http://schemas.microsoft.com/office/powerpoint/2012/main" xmlns:com="http://schemas.openxmlformats.org/drawingml/2006/compatibility" xmlns:pvml="urn:schemas-microsoft-com:office:powerpoint" xmlns:v="urn:schemas-microsoft-com:vml" xmlns:o="urn:schemas-microsoft-com:office:office" xmlns:dgm="http://schemas.openxmlformats.org/drawingml/2006/diagram" xmlns:c="http://schemas.openxmlformats.org/drawingml/2006/chart" xmlns:mv="urn:schemas-microsoft-com:mac:vml" xmlns="">
+    <mc:Fallback xmlns="" xmlns:mv="urn:schemas-microsoft-com:mac:vml" xmlns:c="http://schemas.openxmlformats.org/drawingml/2006/chart" xmlns:dgm="http://schemas.openxmlformats.org/drawingml/2006/diagram" xmlns:o="urn:schemas-microsoft-com:office:office" xmlns:v="urn:schemas-microsoft-com:vml" xmlns:pvml="urn:schemas-microsoft-com:office:powerpoint" xmlns:com="http://schemas.openxmlformats.org/drawingml/2006/compatibility" xmlns:p15="http://schemas.microsoft.com/office/powerpoint/2012/main" xmlns:ahyp="http://schemas.microsoft.com/office/drawing/2018/hyperlinkcolor">
       <p:transition spd="med">
         <p:fade/>
       </p:transition>
@@ -7720,6 +7720,13 @@
           </p:nvPr>
         </p:nvSpPr>
         <p:spPr/>
+        <p:txBody>
+          <a:bodyPr/>
+          <a:lstStyle/>
+          <a:p>
+            <a:endParaRPr lang="fr-BE"/>
+          </a:p>
+        </p:txBody>
       </p:sp>
       <p:pic>
         <p:nvPicPr>
@@ -8655,6 +8662,13 @@
           </p:nvPr>
         </p:nvSpPr>
         <p:spPr/>
+        <p:txBody>
+          <a:bodyPr/>
+          <a:lstStyle/>
+          <a:p>
+            <a:endParaRPr lang="fr-BE"/>
+          </a:p>
+        </p:txBody>
       </p:sp>
       <p:pic>
         <p:nvPicPr>
@@ -9682,7 +9696,7 @@
         <p14:reveal/>
       </p:transition>
     </mc:Choice>
-    <mc:Fallback xmlns="" xmlns:mv="urn:schemas-microsoft-com:mac:vml" xmlns:c="http://schemas.openxmlformats.org/drawingml/2006/chart" xmlns:dgm="http://schemas.openxmlformats.org/drawingml/2006/diagram" xmlns:o="urn:schemas-microsoft-com:office:office" xmlns:v="urn:schemas-microsoft-com:vml" xmlns:pvml="urn:schemas-microsoft-com:office:powerpoint" xmlns:com="http://schemas.openxmlformats.org/drawingml/2006/compatibility" xmlns:p15="http://schemas.microsoft.com/office/powerpoint/2012/main" xmlns:ahyp="http://schemas.microsoft.com/office/drawing/2018/hyperlinkcolor">
+    <mc:Fallback xmlns:ahyp="http://schemas.microsoft.com/office/drawing/2018/hyperlinkcolor" xmlns:p15="http://schemas.microsoft.com/office/powerpoint/2012/main" xmlns:com="http://schemas.openxmlformats.org/drawingml/2006/compatibility" xmlns:pvml="urn:schemas-microsoft-com:office:powerpoint" xmlns:v="urn:schemas-microsoft-com:vml" xmlns:o="urn:schemas-microsoft-com:office:office" xmlns:dgm="http://schemas.openxmlformats.org/drawingml/2006/diagram" xmlns:c="http://schemas.openxmlformats.org/drawingml/2006/chart" xmlns:mv="urn:schemas-microsoft-com:mac:vml" xmlns="">
       <p:transition spd="med">
         <p:fade/>
       </p:transition>
@@ -10478,6 +10492,13 @@
           </p:nvPr>
         </p:nvSpPr>
         <p:spPr/>
+        <p:txBody>
+          <a:bodyPr/>
+          <a:lstStyle/>
+          <a:p>
+            <a:endParaRPr lang="fr-BE"/>
+          </a:p>
+        </p:txBody>
       </p:sp>
       <p:pic>
         <p:nvPicPr>
@@ -15366,6 +15387,13 @@
           </p:nvPr>
         </p:nvSpPr>
         <p:spPr/>
+        <p:txBody>
+          <a:bodyPr/>
+          <a:lstStyle/>
+          <a:p>
+            <a:endParaRPr lang="fr-BE"/>
+          </a:p>
+        </p:txBody>
       </p:sp>
       <p:pic>
         <p:nvPicPr>
@@ -17647,6 +17675,13 @@
           </p:nvPr>
         </p:nvSpPr>
         <p:spPr/>
+        <p:txBody>
+          <a:bodyPr/>
+          <a:lstStyle/>
+          <a:p>
+            <a:endParaRPr lang="fr-BE"/>
+          </a:p>
+        </p:txBody>
       </p:sp>
       <p:pic>
         <p:nvPicPr>
@@ -17801,208 +17836,208 @@
               <a:buNone/>
             </a:pPr>
             <a:r>
-              <a:rPr lang="en-US" b="1" dirty="0">
-                <a:solidFill>
-                  <a:schemeClr val="accent6">
-                    <a:lumMod val="50000"/>
-                  </a:schemeClr>
-                </a:solidFill>
-                <a:latin typeface="Courier New" panose="02070309020205020404" pitchFamily="49" charset="0"/>
+              <a:rPr lang="en-US" dirty="0">
+                <a:solidFill>
+                  <a:schemeClr val="accent6">
+                    <a:lumMod val="50000"/>
+                  </a:schemeClr>
+                </a:solidFill>
+                <a:latin typeface="Consolas" panose="020B0609020204030204" pitchFamily="49" charset="0"/>
                 <a:cs typeface="Courier New" panose="02070309020205020404" pitchFamily="49" charset="0"/>
               </a:rPr>
               <a:t>&lt;</a:t>
             </a:r>
             <a:r>
-              <a:rPr lang="en-US" b="1" dirty="0" err="1">
-                <a:solidFill>
-                  <a:schemeClr val="accent6">
-                    <a:lumMod val="50000"/>
-                  </a:schemeClr>
-                </a:solidFill>
-                <a:latin typeface="Courier New" panose="02070309020205020404" pitchFamily="49" charset="0"/>
+              <a:rPr lang="en-US" dirty="0" err="1">
+                <a:solidFill>
+                  <a:schemeClr val="accent6">
+                    <a:lumMod val="50000"/>
+                  </a:schemeClr>
+                </a:solidFill>
+                <a:latin typeface="Consolas" panose="020B0609020204030204" pitchFamily="49" charset="0"/>
                 <a:cs typeface="Courier New" panose="02070309020205020404" pitchFamily="49" charset="0"/>
               </a:rPr>
               <a:t>img</a:t>
             </a:r>
             <a:r>
-              <a:rPr lang="en-US" b="1" dirty="0">
-                <a:solidFill>
-                  <a:schemeClr val="accent6">
-                    <a:lumMod val="50000"/>
-                  </a:schemeClr>
-                </a:solidFill>
-                <a:latin typeface="Courier New" panose="02070309020205020404" pitchFamily="49" charset="0"/>
+              <a:rPr lang="en-US" dirty="0">
+                <a:solidFill>
+                  <a:schemeClr val="accent6">
+                    <a:lumMod val="50000"/>
+                  </a:schemeClr>
+                </a:solidFill>
+                <a:latin typeface="Consolas" panose="020B0609020204030204" pitchFamily="49" charset="0"/>
                 <a:cs typeface="Courier New" panose="02070309020205020404" pitchFamily="49" charset="0"/>
               </a:rPr>
               <a:t> id="</a:t>
             </a:r>
             <a:r>
-              <a:rPr lang="en-US" b="1" dirty="0">
+              <a:rPr lang="en-US" dirty="0">
                 <a:solidFill>
                   <a:schemeClr val="accent2"/>
                 </a:solidFill>
-                <a:latin typeface="Courier New" panose="02070309020205020404" pitchFamily="49" charset="0"/>
+                <a:latin typeface="Consolas" panose="020B0609020204030204" pitchFamily="49" charset="0"/>
                 <a:cs typeface="Courier New" panose="02070309020205020404" pitchFamily="49" charset="0"/>
               </a:rPr>
               <a:t>target</a:t>
             </a:r>
             <a:r>
-              <a:rPr lang="en-US" b="1" dirty="0">
-                <a:solidFill>
-                  <a:schemeClr val="accent6">
-                    <a:lumMod val="50000"/>
-                  </a:schemeClr>
-                </a:solidFill>
-                <a:latin typeface="Courier New" panose="02070309020205020404" pitchFamily="49" charset="0"/>
+              <a:rPr lang="en-US" dirty="0">
+                <a:solidFill>
+                  <a:schemeClr val="accent6">
+                    <a:lumMod val="50000"/>
+                  </a:schemeClr>
+                </a:solidFill>
+                <a:latin typeface="Consolas" panose="020B0609020204030204" pitchFamily="49" charset="0"/>
                 <a:cs typeface="Courier New" panose="02070309020205020404" pitchFamily="49" charset="0"/>
               </a:rPr>
               <a:t>" </a:t>
             </a:r>
             <a:br>
-              <a:rPr lang="en-US" b="1" dirty="0">
-                <a:solidFill>
-                  <a:schemeClr val="accent6">
-                    <a:lumMod val="50000"/>
-                  </a:schemeClr>
-                </a:solidFill>
-                <a:latin typeface="Courier New" panose="02070309020205020404" pitchFamily="49" charset="0"/>
+              <a:rPr lang="en-US" dirty="0">
+                <a:solidFill>
+                  <a:schemeClr val="accent6">
+                    <a:lumMod val="50000"/>
+                  </a:schemeClr>
+                </a:solidFill>
+                <a:latin typeface="Consolas" panose="020B0609020204030204" pitchFamily="49" charset="0"/>
                 <a:cs typeface="Courier New" panose="02070309020205020404" pitchFamily="49" charset="0"/>
               </a:rPr>
             </a:br>
             <a:r>
-              <a:rPr lang="en-US" b="1" dirty="0">
-                <a:solidFill>
-                  <a:schemeClr val="accent6">
-                    <a:lumMod val="50000"/>
-                  </a:schemeClr>
-                </a:solidFill>
-                <a:latin typeface="Courier New" panose="02070309020205020404" pitchFamily="49" charset="0"/>
+              <a:rPr lang="en-US" dirty="0">
+                <a:solidFill>
+                  <a:schemeClr val="accent6">
+                    <a:lumMod val="50000"/>
+                  </a:schemeClr>
+                </a:solidFill>
+                <a:latin typeface="Consolas" panose="020B0609020204030204" pitchFamily="49" charset="0"/>
                 <a:cs typeface="Courier New" panose="02070309020205020404" pitchFamily="49" charset="0"/>
               </a:rPr>
               <a:t>     </a:t>
             </a:r>
             <a:r>
-              <a:rPr lang="en-US" b="1" dirty="0" err="1">
-                <a:solidFill>
-                  <a:schemeClr val="accent6">
-                    <a:lumMod val="50000"/>
-                  </a:schemeClr>
-                </a:solidFill>
-                <a:latin typeface="Courier New" panose="02070309020205020404" pitchFamily="49" charset="0"/>
+              <a:rPr lang="en-US" dirty="0" err="1">
+                <a:solidFill>
+                  <a:schemeClr val="accent6">
+                    <a:lumMod val="50000"/>
+                  </a:schemeClr>
+                </a:solidFill>
+                <a:latin typeface="Consolas" panose="020B0609020204030204" pitchFamily="49" charset="0"/>
                 <a:cs typeface="Courier New" panose="02070309020205020404" pitchFamily="49" charset="0"/>
               </a:rPr>
               <a:t>src</a:t>
             </a:r>
             <a:r>
-              <a:rPr lang="en-US" b="1" dirty="0">
-                <a:solidFill>
-                  <a:schemeClr val="accent6">
-                    <a:lumMod val="50000"/>
-                  </a:schemeClr>
-                </a:solidFill>
-                <a:latin typeface="Courier New" panose="02070309020205020404" pitchFamily="49" charset="0"/>
+              <a:rPr lang="en-US" dirty="0">
+                <a:solidFill>
+                  <a:schemeClr val="accent6">
+                    <a:lumMod val="50000"/>
+                  </a:schemeClr>
+                </a:solidFill>
+                <a:latin typeface="Consolas" panose="020B0609020204030204" pitchFamily="49" charset="0"/>
                 <a:cs typeface="Courier New" panose="02070309020205020404" pitchFamily="49" charset="0"/>
               </a:rPr>
               <a:t>="logo103x90-V6-beige_bg.png"&gt;</a:t>
             </a:r>
             <a:br>
-              <a:rPr lang="en-US" b="1" dirty="0">
-                <a:solidFill>
-                  <a:schemeClr val="accent6">
-                    <a:lumMod val="50000"/>
-                  </a:schemeClr>
-                </a:solidFill>
-                <a:latin typeface="Courier New" panose="02070309020205020404" pitchFamily="49" charset="0"/>
+              <a:rPr lang="en-US" dirty="0">
+                <a:solidFill>
+                  <a:schemeClr val="accent6">
+                    <a:lumMod val="50000"/>
+                  </a:schemeClr>
+                </a:solidFill>
+                <a:latin typeface="Consolas" panose="020B0609020204030204" pitchFamily="49" charset="0"/>
                 <a:cs typeface="Courier New" panose="02070309020205020404" pitchFamily="49" charset="0"/>
               </a:rPr>
             </a:br>
             <a:r>
-              <a:rPr lang="en-US" b="1" dirty="0">
-                <a:solidFill>
-                  <a:schemeClr val="accent6">
-                    <a:lumMod val="50000"/>
-                  </a:schemeClr>
-                </a:solidFill>
-                <a:latin typeface="Courier New" panose="02070309020205020404" pitchFamily="49" charset="0"/>
+              <a:rPr lang="en-US" dirty="0">
+                <a:solidFill>
+                  <a:schemeClr val="accent6">
+                    <a:lumMod val="50000"/>
+                  </a:schemeClr>
+                </a:solidFill>
+                <a:latin typeface="Consolas" panose="020B0609020204030204" pitchFamily="49" charset="0"/>
                 <a:cs typeface="Courier New" panose="02070309020205020404" pitchFamily="49" charset="0"/>
               </a:rPr>
               <a:t>…</a:t>
             </a:r>
             <a:br>
-              <a:rPr lang="en-US" b="1" dirty="0">
-                <a:solidFill>
-                  <a:schemeClr val="accent6">
-                    <a:lumMod val="50000"/>
-                  </a:schemeClr>
-                </a:solidFill>
-                <a:latin typeface="Courier New" panose="02070309020205020404" pitchFamily="49" charset="0"/>
+              <a:rPr lang="en-US" dirty="0">
+                <a:solidFill>
+                  <a:schemeClr val="accent6">
+                    <a:lumMod val="50000"/>
+                  </a:schemeClr>
+                </a:solidFill>
+                <a:latin typeface="Consolas" panose="020B0609020204030204" pitchFamily="49" charset="0"/>
                 <a:cs typeface="Courier New" panose="02070309020205020404" pitchFamily="49" charset="0"/>
               </a:rPr>
             </a:br>
             <a:r>
-              <a:rPr lang="en-US" b="1" dirty="0">
-                <a:solidFill>
-                  <a:schemeClr val="accent6">
-                    <a:lumMod val="50000"/>
-                  </a:schemeClr>
-                </a:solidFill>
-                <a:latin typeface="Courier New" panose="02070309020205020404" pitchFamily="49" charset="0"/>
+              <a:rPr lang="en-US" dirty="0">
+                <a:solidFill>
+                  <a:schemeClr val="accent6">
+                    <a:lumMod val="50000"/>
+                  </a:schemeClr>
+                </a:solidFill>
+                <a:latin typeface="Consolas" panose="020B0609020204030204" pitchFamily="49" charset="0"/>
                 <a:cs typeface="Courier New" panose="02070309020205020404" pitchFamily="49" charset="0"/>
               </a:rPr>
               <a:t>$("#</a:t>
             </a:r>
             <a:r>
-              <a:rPr lang="en-US" b="1">
+              <a:rPr lang="en-US">
                 <a:solidFill>
                   <a:schemeClr val="accent2"/>
                 </a:solidFill>
-                <a:latin typeface="Courier New" panose="02070309020205020404" pitchFamily="49" charset="0"/>
+                <a:latin typeface="Consolas" panose="020B0609020204030204" pitchFamily="49" charset="0"/>
                 <a:cs typeface="Courier New" panose="02070309020205020404" pitchFamily="49" charset="0"/>
               </a:rPr>
               <a:t>target</a:t>
             </a:r>
             <a:r>
-              <a:rPr lang="en-US" b="1">
-                <a:solidFill>
-                  <a:schemeClr val="accent6">
-                    <a:lumMod val="50000"/>
-                  </a:schemeClr>
-                </a:solidFill>
-                <a:latin typeface="Courier New" panose="02070309020205020404" pitchFamily="49" charset="0"/>
+              <a:rPr lang="en-US">
+                <a:solidFill>
+                  <a:schemeClr val="accent6">
+                    <a:lumMod val="50000"/>
+                  </a:schemeClr>
+                </a:solidFill>
+                <a:latin typeface="Consolas" panose="020B0609020204030204" pitchFamily="49" charset="0"/>
                 <a:cs typeface="Courier New" panose="02070309020205020404" pitchFamily="49" charset="0"/>
               </a:rPr>
               <a:t>").</a:t>
             </a:r>
             <a:r>
-              <a:rPr lang="en-US" b="1">
+              <a:rPr lang="en-US">
                 <a:solidFill>
                   <a:schemeClr val="accent5"/>
                 </a:solidFill>
-                <a:latin typeface="Courier New" panose="02070309020205020404" pitchFamily="49" charset="0"/>
+                <a:latin typeface="Consolas" panose="020B0609020204030204" pitchFamily="49" charset="0"/>
                 <a:cs typeface="Courier New" panose="02070309020205020404" pitchFamily="49" charset="0"/>
               </a:rPr>
               <a:t>on( "click", </a:t>
             </a:r>
             <a:r>
-              <a:rPr lang="en-US" b="1">
-                <a:solidFill>
-                  <a:schemeClr val="accent6">
-                    <a:lumMod val="50000"/>
-                  </a:schemeClr>
-                </a:solidFill>
-                <a:latin typeface="Courier New" panose="02070309020205020404" pitchFamily="49" charset="0"/>
+              <a:rPr lang="en-US">
+                <a:solidFill>
+                  <a:schemeClr val="accent6">
+                    <a:lumMod val="50000"/>
+                  </a:schemeClr>
+                </a:solidFill>
+                <a:latin typeface="Consolas" panose="020B0609020204030204" pitchFamily="49" charset="0"/>
                 <a:cs typeface="Courier New" panose="02070309020205020404" pitchFamily="49" charset="0"/>
               </a:rPr>
               <a:t>function</a:t>
             </a:r>
             <a:r>
-              <a:rPr lang="en-US" b="1" dirty="0">
-                <a:solidFill>
-                  <a:schemeClr val="accent6">
-                    <a:lumMod val="50000"/>
-                  </a:schemeClr>
-                </a:solidFill>
-                <a:latin typeface="Courier New" panose="02070309020205020404" pitchFamily="49" charset="0"/>
+              <a:rPr lang="en-US" dirty="0">
+                <a:solidFill>
+                  <a:schemeClr val="accent6">
+                    <a:lumMod val="50000"/>
+                  </a:schemeClr>
+                </a:solidFill>
+                <a:latin typeface="Consolas" panose="020B0609020204030204" pitchFamily="49" charset="0"/>
                 <a:cs typeface="Courier New" panose="02070309020205020404" pitchFamily="49" charset="0"/>
               </a:rPr>
               <a:t>() {	</a:t>
@@ -18013,73 +18048,73 @@
               <a:buNone/>
             </a:pPr>
             <a:r>
-              <a:rPr lang="en-US" b="1" dirty="0">
-                <a:solidFill>
-                  <a:schemeClr val="accent6">
-                    <a:lumMod val="50000"/>
-                  </a:schemeClr>
-                </a:solidFill>
-                <a:latin typeface="Courier New" panose="02070309020205020404" pitchFamily="49" charset="0"/>
+              <a:rPr lang="en-US" dirty="0">
+                <a:solidFill>
+                  <a:schemeClr val="accent6">
+                    <a:lumMod val="50000"/>
+                  </a:schemeClr>
+                </a:solidFill>
+                <a:latin typeface="Consolas" panose="020B0609020204030204" pitchFamily="49" charset="0"/>
                 <a:cs typeface="Courier New" panose="02070309020205020404" pitchFamily="49" charset="0"/>
               </a:rPr>
               <a:t>	</a:t>
             </a:r>
             <a:r>
-              <a:rPr lang="en-US" b="1" dirty="0">
+              <a:rPr lang="en-US" dirty="0">
                 <a:solidFill>
                   <a:schemeClr val="bg1">
                     <a:lumMod val="50000"/>
                   </a:schemeClr>
                 </a:solidFill>
-                <a:latin typeface="Courier New" panose="02070309020205020404" pitchFamily="49" charset="0"/>
+                <a:latin typeface="Consolas" panose="020B0609020204030204" pitchFamily="49" charset="0"/>
                 <a:cs typeface="Courier New" panose="02070309020205020404" pitchFamily="49" charset="0"/>
               </a:rPr>
               <a:t>// code </a:t>
             </a:r>
             <a:r>
-              <a:rPr lang="en-US" b="1" dirty="0" err="1">
+              <a:rPr lang="en-US" dirty="0" err="1">
                 <a:solidFill>
                   <a:schemeClr val="bg1">
                     <a:lumMod val="50000"/>
                   </a:schemeClr>
                 </a:solidFill>
-                <a:latin typeface="Courier New" panose="02070309020205020404" pitchFamily="49" charset="0"/>
+                <a:latin typeface="Consolas" panose="020B0609020204030204" pitchFamily="49" charset="0"/>
                 <a:cs typeface="Courier New" panose="02070309020205020404" pitchFamily="49" charset="0"/>
               </a:rPr>
               <a:t>exécuté</a:t>
             </a:r>
             <a:r>
-              <a:rPr lang="en-US" b="1" dirty="0">
+              <a:rPr lang="en-US" dirty="0">
                 <a:solidFill>
                   <a:schemeClr val="bg1">
                     <a:lumMod val="50000"/>
                   </a:schemeClr>
                 </a:solidFill>
-                <a:latin typeface="Courier New" panose="02070309020205020404" pitchFamily="49" charset="0"/>
+                <a:latin typeface="Consolas" panose="020B0609020204030204" pitchFamily="49" charset="0"/>
                 <a:cs typeface="Courier New" panose="02070309020205020404" pitchFamily="49" charset="0"/>
               </a:rPr>
               <a:t> au moment de </a:t>
             </a:r>
             <a:r>
-              <a:rPr lang="en-US" b="1" dirty="0" err="1">
+              <a:rPr lang="en-US" dirty="0" err="1">
                 <a:solidFill>
                   <a:schemeClr val="bg1">
                     <a:lumMod val="50000"/>
                   </a:schemeClr>
                 </a:solidFill>
-                <a:latin typeface="Courier New" panose="02070309020205020404" pitchFamily="49" charset="0"/>
+                <a:latin typeface="Consolas" panose="020B0609020204030204" pitchFamily="49" charset="0"/>
                 <a:cs typeface="Courier New" panose="02070309020205020404" pitchFamily="49" charset="0"/>
               </a:rPr>
               <a:t>l'évènement</a:t>
             </a:r>
             <a:r>
-              <a:rPr lang="en-US" b="1" dirty="0">
+              <a:rPr lang="en-US" dirty="0">
                 <a:solidFill>
                   <a:schemeClr val="bg1">
                     <a:lumMod val="50000"/>
                   </a:schemeClr>
                 </a:solidFill>
-                <a:latin typeface="Courier New" panose="02070309020205020404" pitchFamily="49" charset="0"/>
+                <a:latin typeface="Consolas" panose="020B0609020204030204" pitchFamily="49" charset="0"/>
                 <a:cs typeface="Courier New" panose="02070309020205020404" pitchFamily="49" charset="0"/>
               </a:rPr>
               <a:t> !</a:t>
@@ -18090,37 +18125,37 @@
               <a:buNone/>
             </a:pPr>
             <a:r>
-              <a:rPr lang="en-US" b="1" dirty="0">
-                <a:solidFill>
-                  <a:schemeClr val="accent6">
-                    <a:lumMod val="50000"/>
-                  </a:schemeClr>
-                </a:solidFill>
-                <a:latin typeface="Courier New" panose="02070309020205020404" pitchFamily="49" charset="0"/>
+              <a:rPr lang="en-US" dirty="0">
+                <a:solidFill>
+                  <a:schemeClr val="accent6">
+                    <a:lumMod val="50000"/>
+                  </a:schemeClr>
+                </a:solidFill>
+                <a:latin typeface="Consolas" panose="020B0609020204030204" pitchFamily="49" charset="0"/>
                 <a:cs typeface="Courier New" panose="02070309020205020404" pitchFamily="49" charset="0"/>
               </a:rPr>
               <a:t>	var </a:t>
             </a:r>
             <a:r>
-              <a:rPr lang="en-US" b="1" dirty="0" err="1">
+              <a:rPr lang="en-US" dirty="0" err="1">
                 <a:solidFill>
                   <a:schemeClr val="accent6">
                     <a:lumMod val="10000"/>
                   </a:schemeClr>
                 </a:solidFill>
-                <a:latin typeface="Courier New" panose="02070309020205020404" pitchFamily="49" charset="0"/>
+                <a:latin typeface="Consolas" panose="020B0609020204030204" pitchFamily="49" charset="0"/>
                 <a:cs typeface="Courier New" panose="02070309020205020404" pitchFamily="49" charset="0"/>
               </a:rPr>
               <a:t>mip</a:t>
             </a:r>
             <a:r>
-              <a:rPr lang="en-US" b="1" dirty="0">
-                <a:solidFill>
-                  <a:schemeClr val="accent6">
-                    <a:lumMod val="50000"/>
-                  </a:schemeClr>
-                </a:solidFill>
-                <a:latin typeface="Courier New" panose="02070309020205020404" pitchFamily="49" charset="0"/>
+              <a:rPr lang="en-US" dirty="0">
+                <a:solidFill>
+                  <a:schemeClr val="accent6">
+                    <a:lumMod val="50000"/>
+                  </a:schemeClr>
+                </a:solidFill>
+                <a:latin typeface="Consolas" panose="020B0609020204030204" pitchFamily="49" charset="0"/>
                 <a:cs typeface="Courier New" panose="02070309020205020404" pitchFamily="49" charset="0"/>
               </a:rPr>
               <a:t> = {</a:t>
@@ -18131,61 +18166,61 @@
               <a:buNone/>
             </a:pPr>
             <a:r>
-              <a:rPr lang="en-US" b="1" dirty="0">
-                <a:solidFill>
-                  <a:schemeClr val="accent6">
-                    <a:lumMod val="50000"/>
-                  </a:schemeClr>
-                </a:solidFill>
-                <a:latin typeface="Courier New" panose="02070309020205020404" pitchFamily="49" charset="0"/>
+              <a:rPr lang="en-US" dirty="0">
+                <a:solidFill>
+                  <a:schemeClr val="accent6">
+                    <a:lumMod val="50000"/>
+                  </a:schemeClr>
+                </a:solidFill>
+                <a:latin typeface="Consolas" panose="020B0609020204030204" pitchFamily="49" charset="0"/>
                 <a:cs typeface="Courier New" panose="02070309020205020404" pitchFamily="49" charset="0"/>
               </a:rPr>
               <a:t>		top : </a:t>
             </a:r>
             <a:r>
-              <a:rPr lang="en-US" b="1" dirty="0" err="1">
-                <a:solidFill>
-                  <a:schemeClr val="accent6">
-                    <a:lumMod val="50000"/>
-                  </a:schemeClr>
-                </a:solidFill>
-                <a:latin typeface="Courier New" panose="02070309020205020404" pitchFamily="49" charset="0"/>
+              <a:rPr lang="en-US" dirty="0" err="1">
+                <a:solidFill>
+                  <a:schemeClr val="accent6">
+                    <a:lumMod val="50000"/>
+                  </a:schemeClr>
+                </a:solidFill>
+                <a:latin typeface="Consolas" panose="020B0609020204030204" pitchFamily="49" charset="0"/>
                 <a:cs typeface="Courier New" panose="02070309020205020404" pitchFamily="49" charset="0"/>
               </a:rPr>
               <a:t>Math.floor</a:t>
             </a:r>
             <a:r>
-              <a:rPr lang="en-US" b="1" dirty="0">
-                <a:solidFill>
-                  <a:schemeClr val="accent6">
-                    <a:lumMod val="50000"/>
-                  </a:schemeClr>
-                </a:solidFill>
-                <a:latin typeface="Courier New" panose="02070309020205020404" pitchFamily="49" charset="0"/>
+              <a:rPr lang="en-US" dirty="0">
+                <a:solidFill>
+                  <a:schemeClr val="accent6">
+                    <a:lumMod val="50000"/>
+                  </a:schemeClr>
+                </a:solidFill>
+                <a:latin typeface="Consolas" panose="020B0609020204030204" pitchFamily="49" charset="0"/>
                 <a:cs typeface="Courier New" panose="02070309020205020404" pitchFamily="49" charset="0"/>
               </a:rPr>
               <a:t>(</a:t>
             </a:r>
             <a:r>
-              <a:rPr lang="en-US" b="1" dirty="0" err="1">
-                <a:solidFill>
-                  <a:schemeClr val="accent6">
-                    <a:lumMod val="50000"/>
-                  </a:schemeClr>
-                </a:solidFill>
-                <a:latin typeface="Courier New" panose="02070309020205020404" pitchFamily="49" charset="0"/>
+              <a:rPr lang="en-US" dirty="0" err="1">
+                <a:solidFill>
+                  <a:schemeClr val="accent6">
+                    <a:lumMod val="50000"/>
+                  </a:schemeClr>
+                </a:solidFill>
+                <a:latin typeface="Consolas" panose="020B0609020204030204" pitchFamily="49" charset="0"/>
                 <a:cs typeface="Courier New" panose="02070309020205020404" pitchFamily="49" charset="0"/>
               </a:rPr>
               <a:t>Math.random</a:t>
             </a:r>
             <a:r>
-              <a:rPr lang="en-US" b="1" dirty="0">
-                <a:solidFill>
-                  <a:schemeClr val="accent6">
-                    <a:lumMod val="50000"/>
-                  </a:schemeClr>
-                </a:solidFill>
-                <a:latin typeface="Courier New" panose="02070309020205020404" pitchFamily="49" charset="0"/>
+              <a:rPr lang="en-US" dirty="0">
+                <a:solidFill>
+                  <a:schemeClr val="accent6">
+                    <a:lumMod val="50000"/>
+                  </a:schemeClr>
+                </a:solidFill>
+                <a:latin typeface="Consolas" panose="020B0609020204030204" pitchFamily="49" charset="0"/>
                 <a:cs typeface="Courier New" panose="02070309020205020404" pitchFamily="49" charset="0"/>
               </a:rPr>
               <a:t>()*480),</a:t>
@@ -18196,61 +18231,61 @@
               <a:buNone/>
             </a:pPr>
             <a:r>
-              <a:rPr lang="en-US" b="1" dirty="0">
-                <a:solidFill>
-                  <a:schemeClr val="accent6">
-                    <a:lumMod val="50000"/>
-                  </a:schemeClr>
-                </a:solidFill>
-                <a:latin typeface="Courier New" panose="02070309020205020404" pitchFamily="49" charset="0"/>
+              <a:rPr lang="en-US" dirty="0">
+                <a:solidFill>
+                  <a:schemeClr val="accent6">
+                    <a:lumMod val="50000"/>
+                  </a:schemeClr>
+                </a:solidFill>
+                <a:latin typeface="Consolas" panose="020B0609020204030204" pitchFamily="49" charset="0"/>
                 <a:cs typeface="Courier New" panose="02070309020205020404" pitchFamily="49" charset="0"/>
               </a:rPr>
               <a:t>		left : </a:t>
             </a:r>
             <a:r>
-              <a:rPr lang="en-US" b="1" dirty="0" err="1">
-                <a:solidFill>
-                  <a:schemeClr val="accent6">
-                    <a:lumMod val="50000"/>
-                  </a:schemeClr>
-                </a:solidFill>
-                <a:latin typeface="Courier New" panose="02070309020205020404" pitchFamily="49" charset="0"/>
+              <a:rPr lang="en-US" dirty="0" err="1">
+                <a:solidFill>
+                  <a:schemeClr val="accent6">
+                    <a:lumMod val="50000"/>
+                  </a:schemeClr>
+                </a:solidFill>
+                <a:latin typeface="Consolas" panose="020B0609020204030204" pitchFamily="49" charset="0"/>
                 <a:cs typeface="Courier New" panose="02070309020205020404" pitchFamily="49" charset="0"/>
               </a:rPr>
               <a:t>Math.floor</a:t>
             </a:r>
             <a:r>
-              <a:rPr lang="en-US" b="1" dirty="0">
-                <a:solidFill>
-                  <a:schemeClr val="accent6">
-                    <a:lumMod val="50000"/>
-                  </a:schemeClr>
-                </a:solidFill>
-                <a:latin typeface="Courier New" panose="02070309020205020404" pitchFamily="49" charset="0"/>
+              <a:rPr lang="en-US" dirty="0">
+                <a:solidFill>
+                  <a:schemeClr val="accent6">
+                    <a:lumMod val="50000"/>
+                  </a:schemeClr>
+                </a:solidFill>
+                <a:latin typeface="Consolas" panose="020B0609020204030204" pitchFamily="49" charset="0"/>
                 <a:cs typeface="Courier New" panose="02070309020205020404" pitchFamily="49" charset="0"/>
               </a:rPr>
               <a:t>(</a:t>
             </a:r>
             <a:r>
-              <a:rPr lang="en-US" b="1" dirty="0" err="1">
-                <a:solidFill>
-                  <a:schemeClr val="accent6">
-                    <a:lumMod val="50000"/>
-                  </a:schemeClr>
-                </a:solidFill>
-                <a:latin typeface="Courier New" panose="02070309020205020404" pitchFamily="49" charset="0"/>
+              <a:rPr lang="en-US" dirty="0" err="1">
+                <a:solidFill>
+                  <a:schemeClr val="accent6">
+                    <a:lumMod val="50000"/>
+                  </a:schemeClr>
+                </a:solidFill>
+                <a:latin typeface="Consolas" panose="020B0609020204030204" pitchFamily="49" charset="0"/>
                 <a:cs typeface="Courier New" panose="02070309020205020404" pitchFamily="49" charset="0"/>
               </a:rPr>
               <a:t>Math.random</a:t>
             </a:r>
             <a:r>
-              <a:rPr lang="en-US" b="1" dirty="0">
-                <a:solidFill>
-                  <a:schemeClr val="accent6">
-                    <a:lumMod val="50000"/>
-                  </a:schemeClr>
-                </a:solidFill>
-                <a:latin typeface="Courier New" panose="02070309020205020404" pitchFamily="49" charset="0"/>
+              <a:rPr lang="en-US" dirty="0">
+                <a:solidFill>
+                  <a:schemeClr val="accent6">
+                    <a:lumMod val="50000"/>
+                  </a:schemeClr>
+                </a:solidFill>
+                <a:latin typeface="Consolas" panose="020B0609020204030204" pitchFamily="49" charset="0"/>
                 <a:cs typeface="Courier New" panose="02070309020205020404" pitchFamily="49" charset="0"/>
               </a:rPr>
               <a:t>()*640)</a:t>
@@ -18261,13 +18296,13 @@
               <a:buNone/>
             </a:pPr>
             <a:r>
-              <a:rPr lang="en-US" b="1" dirty="0">
-                <a:solidFill>
-                  <a:schemeClr val="accent6">
-                    <a:lumMod val="50000"/>
-                  </a:schemeClr>
-                </a:solidFill>
-                <a:latin typeface="Courier New" panose="02070309020205020404" pitchFamily="49" charset="0"/>
+              <a:rPr lang="en-US" dirty="0">
+                <a:solidFill>
+                  <a:schemeClr val="accent6">
+                    <a:lumMod val="50000"/>
+                  </a:schemeClr>
+                </a:solidFill>
+                <a:latin typeface="Consolas" panose="020B0609020204030204" pitchFamily="49" charset="0"/>
                 <a:cs typeface="Courier New" panose="02070309020205020404" pitchFamily="49" charset="0"/>
               </a:rPr>
               <a:t>	};</a:t>
@@ -18278,59 +18313,59 @@
               <a:buNone/>
             </a:pPr>
             <a:r>
-              <a:rPr lang="en-US" b="1" dirty="0">
-                <a:solidFill>
-                  <a:schemeClr val="accent6">
-                    <a:lumMod val="50000"/>
-                  </a:schemeClr>
-                </a:solidFill>
-                <a:latin typeface="Courier New" panose="02070309020205020404" pitchFamily="49" charset="0"/>
+              <a:rPr lang="en-US" dirty="0">
+                <a:solidFill>
+                  <a:schemeClr val="accent6">
+                    <a:lumMod val="50000"/>
+                  </a:schemeClr>
+                </a:solidFill>
+                <a:latin typeface="Consolas" panose="020B0609020204030204" pitchFamily="49" charset="0"/>
                 <a:cs typeface="Courier New" panose="02070309020205020404" pitchFamily="49" charset="0"/>
               </a:rPr>
               <a:t>	$('#</a:t>
             </a:r>
             <a:r>
-              <a:rPr lang="en-US" b="1" dirty="0">
+              <a:rPr lang="en-US" dirty="0">
                 <a:solidFill>
                   <a:schemeClr val="accent2"/>
                 </a:solidFill>
-                <a:latin typeface="Courier New" panose="02070309020205020404" pitchFamily="49" charset="0"/>
+                <a:latin typeface="Consolas" panose="020B0609020204030204" pitchFamily="49" charset="0"/>
                 <a:cs typeface="Courier New" panose="02070309020205020404" pitchFamily="49" charset="0"/>
               </a:rPr>
               <a:t>target</a:t>
             </a:r>
             <a:r>
-              <a:rPr lang="en-US" b="1" dirty="0">
-                <a:solidFill>
-                  <a:schemeClr val="accent6">
-                    <a:lumMod val="50000"/>
-                  </a:schemeClr>
-                </a:solidFill>
-                <a:latin typeface="Courier New" panose="02070309020205020404" pitchFamily="49" charset="0"/>
+              <a:rPr lang="en-US" dirty="0">
+                <a:solidFill>
+                  <a:schemeClr val="accent6">
+                    <a:lumMod val="50000"/>
+                  </a:schemeClr>
+                </a:solidFill>
+                <a:latin typeface="Consolas" panose="020B0609020204030204" pitchFamily="49" charset="0"/>
                 <a:cs typeface="Courier New" panose="02070309020205020404" pitchFamily="49" charset="0"/>
               </a:rPr>
               <a:t>').offset(</a:t>
             </a:r>
             <a:r>
-              <a:rPr lang="en-US" b="1" dirty="0" err="1">
+              <a:rPr lang="en-US" dirty="0" err="1">
                 <a:solidFill>
                   <a:schemeClr val="accent6">
                     <a:lumMod val="10000"/>
                   </a:schemeClr>
                 </a:solidFill>
-                <a:latin typeface="Courier New" panose="02070309020205020404" pitchFamily="49" charset="0"/>
+                <a:latin typeface="Consolas" panose="020B0609020204030204" pitchFamily="49" charset="0"/>
                 <a:cs typeface="Courier New" panose="02070309020205020404" pitchFamily="49" charset="0"/>
               </a:rPr>
               <a:t>mip</a:t>
             </a:r>
             <a:r>
-              <a:rPr lang="en-US" b="1" dirty="0">
-                <a:solidFill>
-                  <a:schemeClr val="accent6">
-                    <a:lumMod val="50000"/>
-                  </a:schemeClr>
-                </a:solidFill>
-                <a:latin typeface="Courier New" panose="02070309020205020404" pitchFamily="49" charset="0"/>
+              <a:rPr lang="en-US" dirty="0">
+                <a:solidFill>
+                  <a:schemeClr val="accent6">
+                    <a:lumMod val="50000"/>
+                  </a:schemeClr>
+                </a:solidFill>
+                <a:latin typeface="Consolas" panose="020B0609020204030204" pitchFamily="49" charset="0"/>
                 <a:cs typeface="Courier New" panose="02070309020205020404" pitchFamily="49" charset="0"/>
               </a:rPr>
               <a:t>);</a:t>
@@ -18341,48 +18376,48 @@
               <a:buNone/>
             </a:pPr>
             <a:r>
-              <a:rPr lang="en-US" b="1" dirty="0">
-                <a:solidFill>
-                  <a:schemeClr val="accent6">
-                    <a:lumMod val="50000"/>
-                  </a:schemeClr>
-                </a:solidFill>
-                <a:latin typeface="Courier New" panose="02070309020205020404" pitchFamily="49" charset="0"/>
+              <a:rPr lang="en-US" dirty="0">
+                <a:solidFill>
+                  <a:schemeClr val="accent6">
+                    <a:lumMod val="50000"/>
+                  </a:schemeClr>
+                </a:solidFill>
+                <a:latin typeface="Consolas" panose="020B0609020204030204" pitchFamily="49" charset="0"/>
                 <a:cs typeface="Courier New" panose="02070309020205020404" pitchFamily="49" charset="0"/>
               </a:rPr>
               <a:t>	</a:t>
             </a:r>
             <a:r>
-              <a:rPr lang="en-US" b="1" dirty="0">
+              <a:rPr lang="en-US" dirty="0">
                 <a:solidFill>
                   <a:schemeClr val="bg1">
                     <a:lumMod val="50000"/>
                   </a:schemeClr>
                 </a:solidFill>
-                <a:latin typeface="Courier New" panose="02070309020205020404" pitchFamily="49" charset="0"/>
+                <a:latin typeface="Consolas" panose="020B0609020204030204" pitchFamily="49" charset="0"/>
                 <a:cs typeface="Courier New" panose="02070309020205020404" pitchFamily="49" charset="0"/>
               </a:rPr>
               <a:t>// fin du code </a:t>
             </a:r>
             <a:r>
-              <a:rPr lang="en-US" b="1" dirty="0" err="1">
+              <a:rPr lang="en-US" dirty="0" err="1">
                 <a:solidFill>
                   <a:schemeClr val="bg1">
                     <a:lumMod val="50000"/>
                   </a:schemeClr>
                 </a:solidFill>
-                <a:latin typeface="Courier New" panose="02070309020205020404" pitchFamily="49" charset="0"/>
+                <a:latin typeface="Consolas" panose="020B0609020204030204" pitchFamily="49" charset="0"/>
                 <a:cs typeface="Courier New" panose="02070309020205020404" pitchFamily="49" charset="0"/>
               </a:rPr>
               <a:t>évènementiel</a:t>
             </a:r>
-            <a:endParaRPr lang="en-US" b="1" dirty="0">
+            <a:endParaRPr lang="en-US" dirty="0">
               <a:solidFill>
                 <a:schemeClr val="bg1">
                   <a:lumMod val="50000"/>
                 </a:schemeClr>
               </a:solidFill>
-              <a:latin typeface="Courier New" panose="02070309020205020404" pitchFamily="49" charset="0"/>
+              <a:latin typeface="Consolas" panose="020B0609020204030204" pitchFamily="49" charset="0"/>
               <a:cs typeface="Courier New" panose="02070309020205020404" pitchFamily="49" charset="0"/>
             </a:endParaRPr>
           </a:p>
@@ -18391,24 +18426,24 @@
               <a:buNone/>
             </a:pPr>
             <a:r>
-              <a:rPr lang="en-US" b="1" dirty="0">
-                <a:solidFill>
-                  <a:schemeClr val="accent6">
-                    <a:lumMod val="50000"/>
-                  </a:schemeClr>
-                </a:solidFill>
-                <a:latin typeface="Courier New" panose="02070309020205020404" pitchFamily="49" charset="0"/>
+              <a:rPr lang="en-US" dirty="0">
+                <a:solidFill>
+                  <a:schemeClr val="accent6">
+                    <a:lumMod val="50000"/>
+                  </a:schemeClr>
+                </a:solidFill>
+                <a:latin typeface="Consolas" panose="020B0609020204030204" pitchFamily="49" charset="0"/>
                 <a:cs typeface="Courier New" panose="02070309020205020404" pitchFamily="49" charset="0"/>
               </a:rPr>
               <a:t>});</a:t>
             </a:r>
-            <a:endParaRPr lang="fr-BE" b="1" dirty="0">
+            <a:endParaRPr lang="fr-BE" dirty="0">
               <a:solidFill>
                 <a:schemeClr val="accent6">
                   <a:lumMod val="50000"/>
                 </a:schemeClr>
               </a:solidFill>
-              <a:latin typeface="Courier New" panose="02070309020205020404" pitchFamily="49" charset="0"/>
+              <a:latin typeface="Consolas" panose="020B0609020204030204" pitchFamily="49" charset="0"/>
               <a:cs typeface="Courier New" panose="02070309020205020404" pitchFamily="49" charset="0"/>
             </a:endParaRPr>
           </a:p>
@@ -20727,6 +20762,13 @@
           </p:nvPr>
         </p:nvSpPr>
         <p:spPr/>
+        <p:txBody>
+          <a:bodyPr/>
+          <a:lstStyle/>
+          <a:p>
+            <a:endParaRPr lang="fr-BE"/>
+          </a:p>
+        </p:txBody>
       </p:sp>
       <p:pic>
         <p:nvPicPr>
@@ -23849,6 +23891,13 @@
           </p:nvPr>
         </p:nvSpPr>
         <p:spPr/>
+        <p:txBody>
+          <a:bodyPr/>
+          <a:lstStyle/>
+          <a:p>
+            <a:endParaRPr lang="fr-BE"/>
+          </a:p>
+        </p:txBody>
       </p:sp>
       <p:pic>
         <p:nvPicPr>

</xml_diff>